<commit_message>
Add You Will Learn Bullets to PPTs 03 & 04
</commit_message>
<xml_diff>
--- a/Tableau JSAPI - 03 Embedding and Interactions.pptx
+++ b/Tableau JSAPI - 03 Embedding and Interactions.pptx
@@ -128,7 +128,7 @@
       </p14:sectionLst>
     </p:ext>
     <p:ext uri="{EFAFB233-063F-42B5-8137-9DF3F51BA10A}">
-      <p15:sldGuideLst xmlns:p15="http://schemas.microsoft.com/office/powerpoint/2012/main">
+      <p15:sldGuideLst xmlns:p15="http://schemas.microsoft.com/office/powerpoint/2012/main" xmlns="">
         <p15:guide id="1" orient="horz" pos="2160">
           <p15:clr>
             <a:srgbClr val="A4A3A4"/>
@@ -227,7 +227,7 @@
           <a:p>
             <a:fld id="{F06599F2-9818-4545-AFCB-68953993543F}" type="datetimeFigureOut">
               <a:rPr lang="en-US" smtClean="0"/>
-              <a:t>1/26/16</a:t>
+              <a:t>1/28/16</a:t>
             </a:fld>
             <a:endParaRPr lang="en-US"/>
           </a:p>
@@ -791,7 +791,7 @@
   <p:timing>
     <p:tnLst>
       <p:par>
-        <p:cTn id="1" dur="indefinite" restart="never" nodeType="tmRoot"/>
+        <p:cTn xmlns:p14="http://schemas.microsoft.com/office/powerpoint/2010/main" id="1" dur="indefinite" restart="never" nodeType="tmRoot"/>
       </p:par>
     </p:tnLst>
   </p:timing>
@@ -858,7 +858,7 @@
   <p:timing>
     <p:tnLst>
       <p:par>
-        <p:cTn id="1" dur="indefinite" restart="never" nodeType="tmRoot"/>
+        <p:cTn xmlns:p14="http://schemas.microsoft.com/office/powerpoint/2010/main" id="1" dur="indefinite" restart="never" nodeType="tmRoot"/>
       </p:par>
     </p:tnLst>
   </p:timing>
@@ -999,7 +999,7 @@
   <p:timing>
     <p:tnLst>
       <p:par>
-        <p:cTn id="1" dur="indefinite" restart="never" nodeType="tmRoot"/>
+        <p:cTn xmlns:p14="http://schemas.microsoft.com/office/powerpoint/2010/main" id="1" dur="indefinite" restart="never" nodeType="tmRoot"/>
       </p:par>
     </p:tnLst>
   </p:timing>
@@ -1193,7 +1193,7 @@
   <p:timing>
     <p:tnLst>
       <p:par>
-        <p:cTn id="1" dur="indefinite" restart="never" nodeType="tmRoot"/>
+        <p:cTn xmlns:p14="http://schemas.microsoft.com/office/powerpoint/2010/main" id="1" dur="indefinite" restart="never" nodeType="tmRoot"/>
       </p:par>
     </p:tnLst>
   </p:timing>
@@ -1310,7 +1310,7 @@
   <p:timing>
     <p:tnLst>
       <p:par>
-        <p:cTn id="1" dur="indefinite" restart="never" nodeType="tmRoot"/>
+        <p:cTn xmlns:p14="http://schemas.microsoft.com/office/powerpoint/2010/main" id="1" dur="indefinite" restart="never" nodeType="tmRoot"/>
       </p:par>
     </p:tnLst>
   </p:timing>
@@ -1681,7 +1681,7 @@
   <p:timing>
     <p:tnLst>
       <p:par>
-        <p:cTn id="1" dur="indefinite" restart="never" nodeType="tmRoot"/>
+        <p:cTn xmlns:p14="http://schemas.microsoft.com/office/powerpoint/2010/main" id="1" dur="indefinite" restart="never" nodeType="tmRoot"/>
       </p:par>
     </p:tnLst>
   </p:timing>
@@ -1841,7 +1841,7 @@
   <p:timing>
     <p:tnLst>
       <p:par>
-        <p:cTn id="1" dur="indefinite" restart="never" nodeType="tmRoot"/>
+        <p:cTn xmlns:p14="http://schemas.microsoft.com/office/powerpoint/2010/main" id="1" dur="indefinite" restart="never" nodeType="tmRoot"/>
       </p:par>
     </p:tnLst>
   </p:timing>
@@ -2001,7 +2001,7 @@
   <p:timing>
     <p:tnLst>
       <p:par>
-        <p:cTn id="1" dur="indefinite" restart="never" nodeType="tmRoot"/>
+        <p:cTn xmlns:p14="http://schemas.microsoft.com/office/powerpoint/2010/main" id="1" dur="indefinite" restart="never" nodeType="tmRoot"/>
       </p:par>
     </p:tnLst>
   </p:timing>
@@ -2161,7 +2161,7 @@
   <p:timing>
     <p:tnLst>
       <p:par>
-        <p:cTn id="1" dur="indefinite" restart="never" nodeType="tmRoot"/>
+        <p:cTn xmlns:p14="http://schemas.microsoft.com/office/powerpoint/2010/main" id="1" dur="indefinite" restart="never" nodeType="tmRoot"/>
       </p:par>
     </p:tnLst>
   </p:timing>
@@ -2251,7 +2251,7 @@
   <p:timing>
     <p:tnLst>
       <p:par>
-        <p:cTn id="1" dur="indefinite" restart="never" nodeType="tmRoot"/>
+        <p:cTn xmlns:p14="http://schemas.microsoft.com/office/powerpoint/2010/main" id="1" dur="indefinite" restart="never" nodeType="tmRoot"/>
       </p:par>
     </p:tnLst>
   </p:timing>
@@ -2450,7 +2450,7 @@
   <p:timing>
     <p:tnLst>
       <p:par>
-        <p:cTn id="1" dur="indefinite" restart="never" nodeType="tmRoot"/>
+        <p:cTn xmlns:p14="http://schemas.microsoft.com/office/powerpoint/2010/main" id="1" dur="indefinite" restart="never" nodeType="tmRoot"/>
       </p:par>
     </p:tnLst>
   </p:timing>
@@ -2701,7 +2701,7 @@
   <p:timing>
     <p:tnLst>
       <p:par>
-        <p:cTn id="1" dur="indefinite" restart="never" nodeType="tmRoot"/>
+        <p:cTn xmlns:p14="http://schemas.microsoft.com/office/powerpoint/2010/main" id="1" dur="indefinite" restart="never" nodeType="tmRoot"/>
       </p:par>
     </p:tnLst>
   </p:timing>
@@ -2830,7 +2830,7 @@
   <p:timing>
     <p:tnLst>
       <p:par>
-        <p:cTn id="1" dur="indefinite" restart="never" nodeType="tmRoot"/>
+        <p:cTn xmlns:p14="http://schemas.microsoft.com/office/powerpoint/2010/main" id="1" dur="indefinite" restart="never" nodeType="tmRoot"/>
       </p:par>
     </p:tnLst>
   </p:timing>
@@ -2977,7 +2977,7 @@
   <p:timing>
     <p:tnLst>
       <p:par>
-        <p:cTn id="1" dur="indefinite" restart="never" nodeType="tmRoot"/>
+        <p:cTn xmlns:p14="http://schemas.microsoft.com/office/powerpoint/2010/main" id="1" dur="indefinite" restart="never" nodeType="tmRoot"/>
       </p:par>
     </p:tnLst>
   </p:timing>
@@ -3273,11 +3273,7 @@
           <a:p>
             <a:r>
               <a:rPr lang="en-US" dirty="0" smtClean="0"/>
-              <a:t>JavaScript </a:t>
-            </a:r>
-            <a:r>
-              <a:rPr lang="en-US" dirty="0" smtClean="0"/>
-              <a:t>API:  Embedding and Interactions</a:t>
+              <a:t>JavaScript API:  Embedding and Interactions</a:t>
             </a:r>
             <a:endParaRPr lang="en-US" dirty="0"/>
           </a:p>
@@ -3325,7 +3321,7 @@
   <p:timing>
     <p:tnLst>
       <p:par>
-        <p:cTn id="1" dur="indefinite" restart="never" nodeType="tmRoot"/>
+        <p:cTn xmlns:p14="http://schemas.microsoft.com/office/powerpoint/2010/main" id="1" dur="indefinite" restart="never" nodeType="tmRoot"/>
       </p:par>
     </p:tnLst>
   </p:timing>
@@ -4008,7 +4004,7 @@
   <p:timing>
     <p:tnLst>
       <p:par>
-        <p:cTn id="1" dur="indefinite" restart="never" nodeType="tmRoot">
+        <p:cTn xmlns:p14="http://schemas.microsoft.com/office/powerpoint/2010/main" id="1" dur="indefinite" restart="never" nodeType="tmRoot">
           <p:childTnLst>
             <p:seq concurrent="1" nextAc="seek">
               <p:cTn id="2" dur="indefinite" nodeType="mainSeq">
@@ -4349,7 +4345,7 @@
                 <a:ea typeface="Gill Sans MT" charset="0"/>
                 <a:cs typeface="Gill Sans MT" charset="0"/>
               </a:rPr>
-              <a:t>TODO #1</a:t>
+              <a:t>Embed using the JavaScript API</a:t>
             </a:r>
             <a:endParaRPr lang="en-US" sz="3200" dirty="0">
               <a:latin typeface="Gill Sans MT" charset="0"/>
@@ -4364,7 +4360,7 @@
                 <a:ea typeface="Gill Sans MT" charset="0"/>
                 <a:cs typeface="Gill Sans MT" charset="0"/>
               </a:rPr>
-              <a:t>TODO #2</a:t>
+              <a:t>Switch tabs on the embedded workbook</a:t>
             </a:r>
             <a:endParaRPr lang="en-US" sz="3200" dirty="0" smtClean="0">
               <a:latin typeface="Gill Sans MT" charset="0"/>
@@ -4379,7 +4375,15 @@
                 <a:ea typeface="Gill Sans MT" charset="0"/>
                 <a:cs typeface="Gill Sans MT" charset="0"/>
               </a:rPr>
-              <a:t>TODO #3</a:t>
+              <a:t>Filter the </a:t>
+            </a:r>
+            <a:r>
+              <a:rPr lang="en-US" sz="3200" dirty="0" err="1" smtClean="0">
+                <a:latin typeface="Gill Sans MT" charset="0"/>
+                <a:ea typeface="Gill Sans MT" charset="0"/>
+                <a:cs typeface="Gill Sans MT" charset="0"/>
+              </a:rPr>
+              <a:t>viz</a:t>
             </a:r>
             <a:endParaRPr lang="en-US" sz="3200" dirty="0" smtClean="0">
               <a:latin typeface="Gill Sans MT" charset="0"/>
@@ -4394,7 +4398,15 @@
                 <a:ea typeface="Gill Sans MT" charset="0"/>
                 <a:cs typeface="Gill Sans MT" charset="0"/>
               </a:rPr>
-              <a:t>TODO #4</a:t>
+              <a:t>Select marks on the </a:t>
+            </a:r>
+            <a:r>
+              <a:rPr lang="en-US" sz="3200" dirty="0" err="1" smtClean="0">
+                <a:latin typeface="Gill Sans MT" charset="0"/>
+                <a:ea typeface="Gill Sans MT" charset="0"/>
+                <a:cs typeface="Gill Sans MT" charset="0"/>
+              </a:rPr>
+              <a:t>viz</a:t>
             </a:r>
             <a:endParaRPr lang="en-US" sz="3200" dirty="0">
               <a:latin typeface="Gill Sans MT" charset="0"/>
@@ -4414,14 +4426,31 @@
             <p:ph type="title"/>
           </p:nvPr>
         </p:nvSpPr>
-        <p:spPr/>
+        <p:spPr>
+          <a:xfrm>
+            <a:off x="634999" y="329005"/>
+            <a:ext cx="11208010" cy="1477328"/>
+          </a:xfrm>
+        </p:spPr>
         <p:txBody>
           <a:bodyPr/>
           <a:lstStyle/>
           <a:p>
             <a:r>
               <a:rPr lang="en-US" dirty="0" smtClean="0"/>
-              <a:t>At the end of this video you will...</a:t>
+              <a:t>At the end of this video you </a:t>
+            </a:r>
+            <a:r>
+              <a:rPr lang="en-US" dirty="0" smtClean="0"/>
+              <a:t>will</a:t>
+            </a:r>
+            <a:r>
+              <a:rPr lang="en-US" dirty="0"/>
+              <a:t> </a:t>
+            </a:r>
+            <a:r>
+              <a:rPr lang="en-US" dirty="0" smtClean="0"/>
+              <a:t>be able to…</a:t>
             </a:r>
             <a:endParaRPr lang="en-US" dirty="0"/>
           </a:p>
@@ -4440,7 +4469,7 @@
   <p:timing>
     <p:tnLst>
       <p:par>
-        <p:cTn id="1" dur="indefinite" restart="never" nodeType="tmRoot">
+        <p:cTn xmlns:p14="http://schemas.microsoft.com/office/powerpoint/2010/main" id="1" dur="indefinite" restart="never" nodeType="tmRoot">
           <p:childTnLst>
             <p:seq concurrent="1" nextAc="seek">
               <p:cTn id="2" dur="indefinite" nodeType="mainSeq">
@@ -4739,6 +4768,45 @@
                                   </p:childTnLst>
                                 </p:cTn>
                               </p:par>
+                              <p:par>
+                                <p:cTn id="27" presetID="9" presetClass="emph" presetSubtype="0" nodeType="withEffect">
+                                  <p:stCondLst>
+                                    <p:cond delay="0"/>
+                                  </p:stCondLst>
+                                  <p:childTnLst>
+                                    <p:set>
+                                      <p:cBhvr rctx="PPT">
+                                        <p:cTn id="28" dur="indefinite"/>
+                                        <p:tgtEl>
+                                          <p:spTgt spid="3">
+                                            <p:txEl>
+                                              <p:pRg st="3" end="3"/>
+                                            </p:txEl>
+                                          </p:spTgt>
+                                        </p:tgtEl>
+                                        <p:attrNameLst>
+                                          <p:attrName>style.opacity</p:attrName>
+                                        </p:attrNameLst>
+                                      </p:cBhvr>
+                                      <p:to>
+                                        <p:strVal val="0.25"/>
+                                      </p:to>
+                                    </p:set>
+                                    <p:animEffect filter="image" prLst="opacity: 0.25">
+                                      <p:cBhvr rctx="IE">
+                                        <p:cTn id="29" dur="indefinite"/>
+                                        <p:tgtEl>
+                                          <p:spTgt spid="3">
+                                            <p:txEl>
+                                              <p:pRg st="3" end="3"/>
+                                            </p:txEl>
+                                          </p:spTgt>
+                                        </p:tgtEl>
+                                      </p:cBhvr>
+                                    </p:animEffect>
+                                  </p:childTnLst>
+                                </p:cTn>
+                              </p:par>
                             </p:childTnLst>
                           </p:cTn>
                         </p:par>
@@ -4891,7 +4959,7 @@
   <p:timing>
     <p:tnLst>
       <p:par>
-        <p:cTn id="1" dur="indefinite" restart="never" nodeType="tmRoot"/>
+        <p:cTn xmlns:p14="http://schemas.microsoft.com/office/powerpoint/2010/main" id="1" dur="indefinite" restart="never" nodeType="tmRoot"/>
       </p:par>
     </p:tnLst>
   </p:timing>
@@ -5137,7 +5205,7 @@
   <p:timing>
     <p:tnLst>
       <p:par>
-        <p:cTn id="1" dur="indefinite" restart="never" nodeType="tmRoot">
+        <p:cTn xmlns:p14="http://schemas.microsoft.com/office/powerpoint/2010/main" id="1" dur="indefinite" restart="never" nodeType="tmRoot">
           <p:childTnLst>
             <p:seq concurrent="1" nextAc="seek">
               <p:cTn id="2" dur="indefinite" nodeType="mainSeq">
@@ -5727,7 +5795,7 @@
   <p:timing>
     <p:tnLst>
       <p:par>
-        <p:cTn id="1" dur="indefinite" restart="never" nodeType="tmRoot"/>
+        <p:cTn xmlns:p14="http://schemas.microsoft.com/office/powerpoint/2010/main" id="1" dur="indefinite" restart="never" nodeType="tmRoot"/>
       </p:par>
     </p:tnLst>
   </p:timing>
@@ -6288,7 +6356,7 @@
   <a:extraClrSchemeLst/>
   <a:extLst>
     <a:ext uri="{05A4C25C-085E-4340-85A3-A5531E510DB2}">
-      <thm15:themeFamily xmlns:thm15="http://schemas.microsoft.com/office/thememl/2012/main" name="Office Theme" id="{62F939B6-93AF-4DB8-9C6B-D6C7DFDC589F}" vid="{4A3C46E8-61CC-4603-A589-7422A47A8E4A}"/>
+      <thm15:themeFamily xmlns:thm15="http://schemas.microsoft.com/office/thememl/2012/main" xmlns="" name="Office Theme" id="{62F939B6-93AF-4DB8-9C6B-D6C7DFDC589F}" vid="{4A3C46E8-61CC-4603-A589-7422A47A8E4A}"/>
     </a:ext>
   </a:extLst>
 </a:theme>

</xml_diff>